<commit_message>
Update AS 4 and Problem Set 2
</commit_message>
<xml_diff>
--- a/Assignment4_Markov_Decision_Process/Report/Figures.pptx
+++ b/Assignment4_Markov_Decision_Process/Report/Figures.pptx
@@ -7262,12 +7262,47 @@
           </a:p>
         </p:txBody>
       </p:sp>
+      <p:sp>
+        <p:nvSpPr>
+          <p:cNvPr id="10" name="TextBox 9">
+            <a:extLst>
+              <a:ext uri="{FF2B5EF4-FFF2-40B4-BE49-F238E27FC236}">
+                <a16:creationId xmlns:a16="http://schemas.microsoft.com/office/drawing/2014/main" id="{AEF88099-1178-6C4F-5260-E7BF2A3EFAC8}"/>
+              </a:ext>
+            </a:extLst>
+          </p:cNvPr>
+          <p:cNvSpPr txBox="1"/>
+          <p:nvPr/>
+        </p:nvSpPr>
+        <p:spPr>
+          <a:xfrm>
+            <a:off x="8323656" y="761848"/>
+            <a:ext cx="1728550" cy="369332"/>
+          </a:xfrm>
+          <a:prstGeom prst="rect">
+            <a:avLst/>
+          </a:prstGeom>
+          <a:noFill/>
+        </p:spPr>
+        <p:txBody>
+          <a:bodyPr wrap="none" rtlCol="0">
+            <a:spAutoFit/>
+          </a:bodyPr>
+          <a:lstStyle/>
+          <a:p>
+            <a:r>
+              <a:rPr lang="en-US" dirty="0"/>
+              <a:t>Q-Learner Policy</a:t>
+            </a:r>
+          </a:p>
+        </p:txBody>
+      </p:sp>
       <p:pic>
         <p:nvPicPr>
-          <p:cNvPr id="9" name="Picture 8" descr="A screenshot of a game&#10;&#10;Description automatically generated">
-            <a:extLst>
-              <a:ext uri="{FF2B5EF4-FFF2-40B4-BE49-F238E27FC236}">
-                <a16:creationId xmlns:a16="http://schemas.microsoft.com/office/drawing/2014/main" id="{4616B52E-88DA-B10C-6F84-C6EE7E3C22C6}"/>
+          <p:cNvPr id="4" name="Picture 3" descr="A screenshot of a game&#10;&#10;Description automatically generated">
+            <a:extLst>
+              <a:ext uri="{FF2B5EF4-FFF2-40B4-BE49-F238E27FC236}">
+                <a16:creationId xmlns:a16="http://schemas.microsoft.com/office/drawing/2014/main" id="{1CA43F58-2322-28E3-732C-7EC0D4EB8960}"/>
               </a:ext>
             </a:extLst>
           </p:cNvPr>
@@ -7290,7 +7325,7 @@
         </p:blipFill>
         <p:spPr>
           <a:xfrm>
-            <a:off x="8254466" y="1486797"/>
+            <a:off x="8247799" y="1485530"/>
             <a:ext cx="3118104" cy="3092120"/>
           </a:xfrm>
           <a:prstGeom prst="rect">
@@ -7298,41 +7333,6 @@
           </a:prstGeom>
         </p:spPr>
       </p:pic>
-      <p:sp>
-        <p:nvSpPr>
-          <p:cNvPr id="10" name="TextBox 9">
-            <a:extLst>
-              <a:ext uri="{FF2B5EF4-FFF2-40B4-BE49-F238E27FC236}">
-                <a16:creationId xmlns:a16="http://schemas.microsoft.com/office/drawing/2014/main" id="{AEF88099-1178-6C4F-5260-E7BF2A3EFAC8}"/>
-              </a:ext>
-            </a:extLst>
-          </p:cNvPr>
-          <p:cNvSpPr txBox="1"/>
-          <p:nvPr/>
-        </p:nvSpPr>
-        <p:spPr>
-          <a:xfrm>
-            <a:off x="8323656" y="761848"/>
-            <a:ext cx="1728550" cy="369332"/>
-          </a:xfrm>
-          <a:prstGeom prst="rect">
-            <a:avLst/>
-          </a:prstGeom>
-          <a:noFill/>
-        </p:spPr>
-        <p:txBody>
-          <a:bodyPr wrap="none" rtlCol="0">
-            <a:spAutoFit/>
-          </a:bodyPr>
-          <a:lstStyle/>
-          <a:p>
-            <a:r>
-              <a:rPr lang="en-US" dirty="0"/>
-              <a:t>Q-Learner Policy</a:t>
-            </a:r>
-          </a:p>
-        </p:txBody>
-      </p:sp>
     </p:spTree>
     <p:extLst>
       <p:ext uri="{BB962C8B-B14F-4D97-AF65-F5344CB8AC3E}">

</xml_diff>